<commit_message>
Ajustes de marcação de código exemplo. Texto comum branco, texto destaque amarelo.
</commit_message>
<xml_diff>
--- a/2-Java-Programmer-Modulo-II/00.Revisao.pptx
+++ b/2-Java-Programmer-Modulo-II/00.Revisao.pptx
@@ -250,7 +250,7 @@
               <a:pPr>
                 <a:defRPr/>
               </a:pPr>
-              <a:t>21/02/2012</a:t>
+              <a:t>04/04/2012</a:t>
             </a:fld>
             <a:endParaRPr lang="pt-BR"/>
           </a:p>
@@ -758,7 +758,7 @@
         <p:nvSpPr>
           <p:cNvPr id="11267" name="Rectangle 1"/>
           <p:cNvSpPr>
-            <a:spLocks noChangeArrowheads="1" noTextEdit="1"/>
+            <a:spLocks noGrp="1" noRot="1" noChangeAspect="1" noChangeArrowheads="1" noTextEdit="1"/>
           </p:cNvSpPr>
           <p:nvPr>
             <p:ph type="sldImg"/>
@@ -780,7 +780,7 @@
         <p:nvSpPr>
           <p:cNvPr id="11268" name="Rectangle 2"/>
           <p:cNvSpPr>
-            <a:spLocks noChangeArrowheads="1"/>
+            <a:spLocks noGrp="1" noChangeArrowheads="1"/>
           </p:cNvSpPr>
           <p:nvPr>
             <p:ph type="body" idx="1"/>
@@ -1226,12 +1226,9 @@
             <a:pPr>
               <a:defRPr/>
             </a:pPr>
-            <a:fld id="{F330E156-E8C8-467A-8303-A2500ABB1852}" type="datetimeFigureOut">
-              <a:rPr lang="pt-BR"/>
-              <a:pPr>
-                <a:defRPr/>
-              </a:pPr>
-              <a:t>21/02/2012</a:t>
+            <a:fld id="{1F625C06-55EC-45DA-9AB3-409C7AFDD928}" type="datetime1">
+              <a:rPr lang="pt-BR" smtClean="0"/>
+              <a:t>04/04/2012</a:t>
             </a:fld>
             <a:endParaRPr lang="pt-BR"/>
           </a:p>
@@ -1418,12 +1415,9 @@
             <a:pPr>
               <a:defRPr/>
             </a:pPr>
-            <a:fld id="{CCAABA37-1AB2-499D-AC72-F77EBDC0428F}" type="datetimeFigureOut">
-              <a:rPr lang="pt-BR"/>
-              <a:pPr>
-                <a:defRPr/>
-              </a:pPr>
-              <a:t>21/02/2012</a:t>
+            <a:fld id="{8AB42B88-AFDA-487E-965C-D624B5E86F33}" type="datetime1">
+              <a:rPr lang="pt-BR" smtClean="0"/>
+              <a:t>04/04/2012</a:t>
             </a:fld>
             <a:endParaRPr lang="pt-BR"/>
           </a:p>
@@ -1620,12 +1614,9 @@
             <a:pPr>
               <a:defRPr/>
             </a:pPr>
-            <a:fld id="{140903FC-E1BE-4483-86A2-7152D60DD0B1}" type="datetimeFigureOut">
-              <a:rPr lang="pt-BR"/>
-              <a:pPr>
-                <a:defRPr/>
-              </a:pPr>
-              <a:t>21/02/2012</a:t>
+            <a:fld id="{0A641760-7DE2-473A-8A5E-5380E4097545}" type="datetime1">
+              <a:rPr lang="pt-BR" smtClean="0"/>
+              <a:t>04/04/2012</a:t>
             </a:fld>
             <a:endParaRPr lang="pt-BR"/>
           </a:p>
@@ -1816,12 +1807,9 @@
             <a:pPr>
               <a:defRPr/>
             </a:pPr>
-            <a:fld id="{4641FC2F-1AC6-411B-89F7-721C7D0ABCD5}" type="datetimeFigureOut">
-              <a:rPr lang="pt-BR"/>
-              <a:pPr>
-                <a:defRPr/>
-              </a:pPr>
-              <a:t>21/02/2012</a:t>
+            <a:fld id="{03734D20-5EBB-4489-8FF9-3A80A81169D4}" type="datetime1">
+              <a:rPr lang="pt-BR" smtClean="0"/>
+              <a:t>04/04/2012</a:t>
             </a:fld>
             <a:endParaRPr lang="pt-BR"/>
           </a:p>
@@ -2322,12 +2310,9 @@
             <a:pPr>
               <a:defRPr/>
             </a:pPr>
-            <a:fld id="{9BB80F04-5005-4075-9852-1FE50FDC52C4}" type="datetimeFigureOut">
-              <a:rPr lang="pt-BR"/>
-              <a:pPr>
-                <a:defRPr/>
-              </a:pPr>
-              <a:t>21/02/2012</a:t>
+            <a:fld id="{E1BAF13A-58B1-4E06-B769-7FC5F732EB9B}" type="datetime1">
+              <a:rPr lang="pt-BR" smtClean="0"/>
+              <a:t>04/04/2012</a:t>
             </a:fld>
             <a:endParaRPr lang="pt-BR"/>
           </a:p>
@@ -2613,12 +2598,9 @@
             <a:pPr>
               <a:defRPr/>
             </a:pPr>
-            <a:fld id="{3D865FBE-1D40-4C41-BB37-00190943803A}" type="datetimeFigureOut">
-              <a:rPr lang="pt-BR"/>
-              <a:pPr>
-                <a:defRPr/>
-              </a:pPr>
-              <a:t>21/02/2012</a:t>
+            <a:fld id="{7A11136D-9EF3-4F5D-B618-A9B36BD3EA09}" type="datetime1">
+              <a:rPr lang="pt-BR" smtClean="0"/>
+              <a:t>04/04/2012</a:t>
             </a:fld>
             <a:endParaRPr lang="pt-BR"/>
           </a:p>
@@ -3014,12 +2996,9 @@
             <a:pPr>
               <a:defRPr/>
             </a:pPr>
-            <a:fld id="{E60A769C-40AB-4C04-ABED-9B194231245D}" type="datetimeFigureOut">
-              <a:rPr lang="pt-BR"/>
-              <a:pPr>
-                <a:defRPr/>
-              </a:pPr>
-              <a:t>21/02/2012</a:t>
+            <a:fld id="{9E18918E-6E54-4BB6-9B92-DA8ADD7333C5}" type="datetime1">
+              <a:rPr lang="pt-BR" smtClean="0"/>
+              <a:t>04/04/2012</a:t>
             </a:fld>
             <a:endParaRPr lang="pt-BR"/>
           </a:p>
@@ -3163,12 +3142,9 @@
             <a:pPr>
               <a:defRPr/>
             </a:pPr>
-            <a:fld id="{ED916734-78E9-47F4-9BE0-C482BA56229E}" type="datetimeFigureOut">
-              <a:rPr lang="pt-BR"/>
-              <a:pPr>
-                <a:defRPr/>
-              </a:pPr>
-              <a:t>21/02/2012</a:t>
+            <a:fld id="{2E896F59-D3F2-4658-AB63-16F4D7454C99}" type="datetime1">
+              <a:rPr lang="pt-BR" smtClean="0"/>
+              <a:t>04/04/2012</a:t>
             </a:fld>
             <a:endParaRPr lang="pt-BR"/>
           </a:p>
@@ -3280,12 +3256,9 @@
             <a:pPr>
               <a:defRPr/>
             </a:pPr>
-            <a:fld id="{4253430C-3BF6-4521-BE62-531D40AAE2DC}" type="datetimeFigureOut">
-              <a:rPr lang="pt-BR"/>
-              <a:pPr>
-                <a:defRPr/>
-              </a:pPr>
-              <a:t>21/02/2012</a:t>
+            <a:fld id="{1F0C6ED4-A3BF-485E-97D2-0BFE3CDC1288}" type="datetime1">
+              <a:rPr lang="pt-BR" smtClean="0"/>
+              <a:t>04/04/2012</a:t>
             </a:fld>
             <a:endParaRPr lang="pt-BR"/>
           </a:p>
@@ -3556,12 +3529,9 @@
             <a:pPr>
               <a:defRPr/>
             </a:pPr>
-            <a:fld id="{1FEBDBD4-AA51-4B3A-9D4D-6056F0A8CE48}" type="datetimeFigureOut">
-              <a:rPr lang="pt-BR"/>
-              <a:pPr>
-                <a:defRPr/>
-              </a:pPr>
-              <a:t>21/02/2012</a:t>
+            <a:fld id="{235B52A6-D014-4087-AAE5-1F962791F717}" type="datetime1">
+              <a:rPr lang="pt-BR" smtClean="0"/>
+              <a:t>04/04/2012</a:t>
             </a:fld>
             <a:endParaRPr lang="pt-BR"/>
           </a:p>
@@ -3840,12 +3810,9 @@
             <a:pPr>
               <a:defRPr/>
             </a:pPr>
-            <a:fld id="{3A96764D-29C6-4ACC-BED0-F0C8E9622EB0}" type="datetimeFigureOut">
-              <a:rPr lang="pt-BR"/>
-              <a:pPr>
-                <a:defRPr/>
-              </a:pPr>
-              <a:t>21/02/2012</a:t>
+            <a:fld id="{F9A795D0-6323-4CE9-93E5-2E9810A124AB}" type="datetime1">
+              <a:rPr lang="pt-BR" smtClean="0"/>
+              <a:t>04/04/2012</a:t>
             </a:fld>
             <a:endParaRPr lang="pt-BR"/>
           </a:p>
@@ -4318,12 +4285,9 @@
             <a:pPr>
               <a:defRPr/>
             </a:pPr>
-            <a:fld id="{DF29E265-F4A6-4014-82EB-04B01F9C09B1}" type="datetimeFigureOut">
-              <a:rPr lang="pt-BR"/>
-              <a:pPr>
-                <a:defRPr/>
-              </a:pPr>
-              <a:t>21/02/2012</a:t>
+            <a:fld id="{BE075C4A-D7E2-46A2-8084-332BC83F4D65}" type="datetime1">
+              <a:rPr lang="pt-BR" smtClean="0"/>
+              <a:t>04/04/2012</a:t>
             </a:fld>
             <a:endParaRPr lang="pt-BR"/>
           </a:p>
@@ -4406,7 +4370,7 @@
               <a:spcAft>
                 <a:spcPts val="0"/>
               </a:spcAft>
-              <a:defRPr kumimoji="0" sz="1000">
+              <a:defRPr kumimoji="0" sz="1600">
                 <a:solidFill>
                   <a:schemeClr val="tx2">
                     <a:shade val="50000"/>
@@ -4422,7 +4386,7 @@
               <a:defRPr/>
             </a:pPr>
             <a:fld id="{ECCA195D-C0E9-42B8-BE92-9606AE4CCCE1}" type="slidenum">
-              <a:rPr lang="pt-BR"/>
+              <a:rPr lang="pt-BR" smtClean="0"/>
               <a:pPr>
                 <a:defRPr/>
               </a:pPr>
@@ -4448,6 +4412,7 @@
     <p:sldLayoutId id="2147483765" r:id="rId10"/>
     <p:sldLayoutId id="2147483766" r:id="rId11"/>
   </p:sldLayoutIdLst>
+  <p:hf hdr="0" ftr="0" dt="0"/>
   <p:txStyles>
     <p:titleStyle>
       <a:lvl1pPr algn="l" rtl="0" eaLnBrk="0" fontAlgn="base" hangingPunct="0">
@@ -5122,6 +5087,35 @@
               <a:rPr lang="pt-BR" smtClean="0"/>
               <a:t>Membros estáticos</a:t>
             </a:r>
+          </a:p>
+        </p:txBody>
+      </p:sp>
+      <p:sp>
+        <p:nvSpPr>
+          <p:cNvPr id="5" name="Espaço Reservado para Número de Slide 4"/>
+          <p:cNvSpPr>
+            <a:spLocks noGrp="1"/>
+          </p:cNvSpPr>
+          <p:nvPr>
+            <p:ph type="sldNum" sz="quarter" idx="12"/>
+          </p:nvPr>
+        </p:nvSpPr>
+        <p:spPr/>
+        <p:txBody>
+          <a:bodyPr/>
+          <a:lstStyle/>
+          <a:p>
+            <a:pPr>
+              <a:defRPr/>
+            </a:pPr>
+            <a:fld id="{E94112EB-0FEF-46C3-BFFD-9F1B6500FE41}" type="slidenum">
+              <a:rPr lang="pt-BR" smtClean="0"/>
+              <a:pPr>
+                <a:defRPr/>
+              </a:pPr>
+              <a:t>2</a:t>
+            </a:fld>
+            <a:endParaRPr lang="pt-BR"/>
           </a:p>
         </p:txBody>
       </p:sp>

</xml_diff>

<commit_message>
Revisão dos capítulos de 1 a 3.
</commit_message>
<xml_diff>
--- a/2-Java-Programmer-Modulo-II/00.Revisao.pptx
+++ b/2-Java-Programmer-Modulo-II/00.Revisao.pptx
@@ -250,7 +250,7 @@
               <a:pPr>
                 <a:defRPr/>
               </a:pPr>
-              <a:t>04/04/2012</a:t>
+              <a:t>16/04/2012</a:t>
             </a:fld>
             <a:endParaRPr lang="pt-BR"/>
           </a:p>
@@ -1228,7 +1228,10 @@
             </a:pPr>
             <a:fld id="{1F625C06-55EC-45DA-9AB3-409C7AFDD928}" type="datetime1">
               <a:rPr lang="pt-BR" smtClean="0"/>
-              <a:t>04/04/2012</a:t>
+              <a:pPr>
+                <a:defRPr/>
+              </a:pPr>
+              <a:t>16/04/2012</a:t>
             </a:fld>
             <a:endParaRPr lang="pt-BR"/>
           </a:p>
@@ -1417,7 +1420,10 @@
             </a:pPr>
             <a:fld id="{8AB42B88-AFDA-487E-965C-D624B5E86F33}" type="datetime1">
               <a:rPr lang="pt-BR" smtClean="0"/>
-              <a:t>04/04/2012</a:t>
+              <a:pPr>
+                <a:defRPr/>
+              </a:pPr>
+              <a:t>16/04/2012</a:t>
             </a:fld>
             <a:endParaRPr lang="pt-BR"/>
           </a:p>
@@ -1616,7 +1622,10 @@
             </a:pPr>
             <a:fld id="{0A641760-7DE2-473A-8A5E-5380E4097545}" type="datetime1">
               <a:rPr lang="pt-BR" smtClean="0"/>
-              <a:t>04/04/2012</a:t>
+              <a:pPr>
+                <a:defRPr/>
+              </a:pPr>
+              <a:t>16/04/2012</a:t>
             </a:fld>
             <a:endParaRPr lang="pt-BR"/>
           </a:p>
@@ -1809,7 +1818,10 @@
             </a:pPr>
             <a:fld id="{03734D20-5EBB-4489-8FF9-3A80A81169D4}" type="datetime1">
               <a:rPr lang="pt-BR" smtClean="0"/>
-              <a:t>04/04/2012</a:t>
+              <a:pPr>
+                <a:defRPr/>
+              </a:pPr>
+              <a:t>16/04/2012</a:t>
             </a:fld>
             <a:endParaRPr lang="pt-BR"/>
           </a:p>
@@ -2312,7 +2324,10 @@
             </a:pPr>
             <a:fld id="{E1BAF13A-58B1-4E06-B769-7FC5F732EB9B}" type="datetime1">
               <a:rPr lang="pt-BR" smtClean="0"/>
-              <a:t>04/04/2012</a:t>
+              <a:pPr>
+                <a:defRPr/>
+              </a:pPr>
+              <a:t>16/04/2012</a:t>
             </a:fld>
             <a:endParaRPr lang="pt-BR"/>
           </a:p>
@@ -2600,7 +2615,10 @@
             </a:pPr>
             <a:fld id="{7A11136D-9EF3-4F5D-B618-A9B36BD3EA09}" type="datetime1">
               <a:rPr lang="pt-BR" smtClean="0"/>
-              <a:t>04/04/2012</a:t>
+              <a:pPr>
+                <a:defRPr/>
+              </a:pPr>
+              <a:t>16/04/2012</a:t>
             </a:fld>
             <a:endParaRPr lang="pt-BR"/>
           </a:p>
@@ -2998,7 +3016,10 @@
             </a:pPr>
             <a:fld id="{9E18918E-6E54-4BB6-9B92-DA8ADD7333C5}" type="datetime1">
               <a:rPr lang="pt-BR" smtClean="0"/>
-              <a:t>04/04/2012</a:t>
+              <a:pPr>
+                <a:defRPr/>
+              </a:pPr>
+              <a:t>16/04/2012</a:t>
             </a:fld>
             <a:endParaRPr lang="pt-BR"/>
           </a:p>
@@ -3144,7 +3165,10 @@
             </a:pPr>
             <a:fld id="{2E896F59-D3F2-4658-AB63-16F4D7454C99}" type="datetime1">
               <a:rPr lang="pt-BR" smtClean="0"/>
-              <a:t>04/04/2012</a:t>
+              <a:pPr>
+                <a:defRPr/>
+              </a:pPr>
+              <a:t>16/04/2012</a:t>
             </a:fld>
             <a:endParaRPr lang="pt-BR"/>
           </a:p>
@@ -3258,7 +3282,10 @@
             </a:pPr>
             <a:fld id="{1F0C6ED4-A3BF-485E-97D2-0BFE3CDC1288}" type="datetime1">
               <a:rPr lang="pt-BR" smtClean="0"/>
-              <a:t>04/04/2012</a:t>
+              <a:pPr>
+                <a:defRPr/>
+              </a:pPr>
+              <a:t>16/04/2012</a:t>
             </a:fld>
             <a:endParaRPr lang="pt-BR"/>
           </a:p>
@@ -3531,7 +3558,10 @@
             </a:pPr>
             <a:fld id="{235B52A6-D014-4087-AAE5-1F962791F717}" type="datetime1">
               <a:rPr lang="pt-BR" smtClean="0"/>
-              <a:t>04/04/2012</a:t>
+              <a:pPr>
+                <a:defRPr/>
+              </a:pPr>
+              <a:t>16/04/2012</a:t>
             </a:fld>
             <a:endParaRPr lang="pt-BR"/>
           </a:p>
@@ -3812,7 +3842,10 @@
             </a:pPr>
             <a:fld id="{F9A795D0-6323-4CE9-93E5-2E9810A124AB}" type="datetime1">
               <a:rPr lang="pt-BR" smtClean="0"/>
-              <a:t>04/04/2012</a:t>
+              <a:pPr>
+                <a:defRPr/>
+              </a:pPr>
+              <a:t>16/04/2012</a:t>
             </a:fld>
             <a:endParaRPr lang="pt-BR"/>
           </a:p>
@@ -4287,7 +4320,10 @@
             </a:pPr>
             <a:fld id="{BE075C4A-D7E2-46A2-8084-332BC83F4D65}" type="datetime1">
               <a:rPr lang="pt-BR" smtClean="0"/>
-              <a:t>04/04/2012</a:t>
+              <a:pPr>
+                <a:defRPr/>
+              </a:pPr>
+              <a:t>16/04/2012</a:t>
             </a:fld>
             <a:endParaRPr lang="pt-BR"/>
           </a:p>
@@ -4996,44 +5032,69 @@
           <a:lstStyle/>
           <a:p>
             <a:r>
-              <a:rPr lang="pt-BR" smtClean="0"/>
+              <a:rPr lang="pt-BR" dirty="0" smtClean="0"/>
               <a:t>Pacote</a:t>
             </a:r>
           </a:p>
           <a:p>
             <a:r>
-              <a:rPr lang="pt-BR" smtClean="0"/>
+              <a:rPr lang="pt-BR" dirty="0" smtClean="0"/>
               <a:t>Classe</a:t>
             </a:r>
           </a:p>
           <a:p>
             <a:r>
-              <a:rPr lang="pt-BR" smtClean="0"/>
+              <a:rPr lang="pt-BR" dirty="0" smtClean="0"/>
               <a:t>Atributos</a:t>
             </a:r>
           </a:p>
           <a:p>
             <a:r>
-              <a:rPr lang="pt-BR" smtClean="0"/>
-              <a:t>Método main()</a:t>
-            </a:r>
-          </a:p>
-          <a:p>
-            <a:r>
-              <a:rPr lang="pt-BR" smtClean="0"/>
-              <a:t>Intâncias</a:t>
-            </a:r>
-          </a:p>
-          <a:p>
-            <a:r>
-              <a:rPr lang="pt-BR" smtClean="0"/>
-              <a:t>Métodos get e set</a:t>
-            </a:r>
-          </a:p>
-          <a:p>
-            <a:r>
-              <a:rPr lang="pt-BR" smtClean="0"/>
-              <a:t>Método toString()</a:t>
+              <a:rPr lang="pt-BR" dirty="0" smtClean="0"/>
+              <a:t>Método </a:t>
+            </a:r>
+            <a:r>
+              <a:rPr lang="pt-BR" dirty="0" err="1" smtClean="0"/>
+              <a:t>main</a:t>
+            </a:r>
+            <a:r>
+              <a:rPr lang="pt-BR" dirty="0" smtClean="0"/>
+              <a:t>()</a:t>
+            </a:r>
+          </a:p>
+          <a:p>
+            <a:r>
+              <a:rPr lang="pt-BR" dirty="0" smtClean="0"/>
+              <a:t>Instâncias</a:t>
+            </a:r>
+            <a:endParaRPr lang="pt-BR" dirty="0" smtClean="0"/>
+          </a:p>
+          <a:p>
+            <a:r>
+              <a:rPr lang="pt-BR" dirty="0" smtClean="0"/>
+              <a:t>Métodos </a:t>
+            </a:r>
+            <a:r>
+              <a:rPr lang="pt-BR" dirty="0" err="1" smtClean="0"/>
+              <a:t>get</a:t>
+            </a:r>
+            <a:r>
+              <a:rPr lang="pt-BR" dirty="0" smtClean="0"/>
+              <a:t> e set</a:t>
+            </a:r>
+          </a:p>
+          <a:p>
+            <a:r>
+              <a:rPr lang="pt-BR" dirty="0" smtClean="0"/>
+              <a:t>Método </a:t>
+            </a:r>
+            <a:r>
+              <a:rPr lang="pt-BR" dirty="0" err="1" smtClean="0"/>
+              <a:t>toString</a:t>
+            </a:r>
+            <a:r>
+              <a:rPr lang="pt-BR" dirty="0" smtClean="0"/>
+              <a:t>()</a:t>
             </a:r>
           </a:p>
         </p:txBody>

</xml_diff>

<commit_message>
Inclusão das páginas de referência da apostila aos slides do capítulo 1.
</commit_message>
<xml_diff>
--- a/2-Java-Programmer-Modulo-II/00.Revisao.pptx
+++ b/2-Java-Programmer-Modulo-II/00.Revisao.pptx
@@ -250,7 +250,7 @@
               <a:pPr>
                 <a:defRPr/>
               </a:pPr>
-              <a:t>16/04/2012</a:t>
+              <a:t>05/05/2012</a:t>
             </a:fld>
             <a:endParaRPr lang="pt-BR"/>
           </a:p>
@@ -1231,7 +1231,7 @@
               <a:pPr>
                 <a:defRPr/>
               </a:pPr>
-              <a:t>16/04/2012</a:t>
+              <a:t>05/05/2012</a:t>
             </a:fld>
             <a:endParaRPr lang="pt-BR"/>
           </a:p>
@@ -1423,7 +1423,7 @@
               <a:pPr>
                 <a:defRPr/>
               </a:pPr>
-              <a:t>16/04/2012</a:t>
+              <a:t>05/05/2012</a:t>
             </a:fld>
             <a:endParaRPr lang="pt-BR"/>
           </a:p>
@@ -1625,7 +1625,7 @@
               <a:pPr>
                 <a:defRPr/>
               </a:pPr>
-              <a:t>16/04/2012</a:t>
+              <a:t>05/05/2012</a:t>
             </a:fld>
             <a:endParaRPr lang="pt-BR"/>
           </a:p>
@@ -1821,7 +1821,7 @@
               <a:pPr>
                 <a:defRPr/>
               </a:pPr>
-              <a:t>16/04/2012</a:t>
+              <a:t>05/05/2012</a:t>
             </a:fld>
             <a:endParaRPr lang="pt-BR"/>
           </a:p>
@@ -2327,7 +2327,7 @@
               <a:pPr>
                 <a:defRPr/>
               </a:pPr>
-              <a:t>16/04/2012</a:t>
+              <a:t>05/05/2012</a:t>
             </a:fld>
             <a:endParaRPr lang="pt-BR"/>
           </a:p>
@@ -2618,7 +2618,7 @@
               <a:pPr>
                 <a:defRPr/>
               </a:pPr>
-              <a:t>16/04/2012</a:t>
+              <a:t>05/05/2012</a:t>
             </a:fld>
             <a:endParaRPr lang="pt-BR"/>
           </a:p>
@@ -3019,7 +3019,7 @@
               <a:pPr>
                 <a:defRPr/>
               </a:pPr>
-              <a:t>16/04/2012</a:t>
+              <a:t>05/05/2012</a:t>
             </a:fld>
             <a:endParaRPr lang="pt-BR"/>
           </a:p>
@@ -3168,7 +3168,7 @@
               <a:pPr>
                 <a:defRPr/>
               </a:pPr>
-              <a:t>16/04/2012</a:t>
+              <a:t>05/05/2012</a:t>
             </a:fld>
             <a:endParaRPr lang="pt-BR"/>
           </a:p>
@@ -3285,7 +3285,7 @@
               <a:pPr>
                 <a:defRPr/>
               </a:pPr>
-              <a:t>16/04/2012</a:t>
+              <a:t>05/05/2012</a:t>
             </a:fld>
             <a:endParaRPr lang="pt-BR"/>
           </a:p>
@@ -3561,7 +3561,7 @@
               <a:pPr>
                 <a:defRPr/>
               </a:pPr>
-              <a:t>16/04/2012</a:t>
+              <a:t>05/05/2012</a:t>
             </a:fld>
             <a:endParaRPr lang="pt-BR"/>
           </a:p>
@@ -3845,7 +3845,7 @@
               <a:pPr>
                 <a:defRPr/>
               </a:pPr>
-              <a:t>16/04/2012</a:t>
+              <a:t>05/05/2012</a:t>
             </a:fld>
             <a:endParaRPr lang="pt-BR"/>
           </a:p>
@@ -4323,7 +4323,7 @@
               <a:pPr>
                 <a:defRPr/>
               </a:pPr>
-              <a:t>16/04/2012</a:t>
+              <a:t>05/05/2012</a:t>
             </a:fld>
             <a:endParaRPr lang="pt-BR"/>
           </a:p>
@@ -5067,7 +5067,6 @@
               <a:rPr lang="pt-BR" dirty="0" smtClean="0"/>
               <a:t>Instâncias</a:t>
             </a:r>
-            <a:endParaRPr lang="pt-BR" dirty="0" smtClean="0"/>
           </a:p>
           <a:p>
             <a:r>

</xml_diff>

<commit_message>
Revisão do material e pequenas correções.
</commit_message>
<xml_diff>
--- a/2-Java-Programmer-Modulo-II/00.Revisao.pptx
+++ b/2-Java-Programmer-Modulo-II/00.Revisao.pptx
@@ -250,7 +250,7 @@
               <a:pPr>
                 <a:defRPr/>
               </a:pPr>
-              <a:t>05/05/2012</a:t>
+              <a:t>24/09/2012</a:t>
             </a:fld>
             <a:endParaRPr lang="pt-BR"/>
           </a:p>
@@ -438,7 +438,7 @@
               <a:pPr>
                 <a:defRPr/>
               </a:pPr>
-              <a:t>‹nº›</a:t>
+              <a:t>‹#›</a:t>
             </a:fld>
             <a:endParaRPr lang="pt-BR"/>
           </a:p>
@@ -1231,7 +1231,7 @@
               <a:pPr>
                 <a:defRPr/>
               </a:pPr>
-              <a:t>05/05/2012</a:t>
+              <a:t>24/09/2012</a:t>
             </a:fld>
             <a:endParaRPr lang="pt-BR"/>
           </a:p>
@@ -1290,7 +1290,7 @@
               <a:pPr>
                 <a:defRPr/>
               </a:pPr>
-              <a:t>‹nº›</a:t>
+              <a:t>‹#›</a:t>
             </a:fld>
             <a:endParaRPr lang="pt-BR"/>
           </a:p>
@@ -1423,7 +1423,7 @@
               <a:pPr>
                 <a:defRPr/>
               </a:pPr>
-              <a:t>05/05/2012</a:t>
+              <a:t>24/09/2012</a:t>
             </a:fld>
             <a:endParaRPr lang="pt-BR"/>
           </a:p>
@@ -1482,7 +1482,7 @@
               <a:pPr>
                 <a:defRPr/>
               </a:pPr>
-              <a:t>‹nº›</a:t>
+              <a:t>‹#›</a:t>
             </a:fld>
             <a:endParaRPr lang="pt-BR"/>
           </a:p>
@@ -1625,7 +1625,7 @@
               <a:pPr>
                 <a:defRPr/>
               </a:pPr>
-              <a:t>05/05/2012</a:t>
+              <a:t>24/09/2012</a:t>
             </a:fld>
             <a:endParaRPr lang="pt-BR"/>
           </a:p>
@@ -1684,7 +1684,7 @@
               <a:pPr>
                 <a:defRPr/>
               </a:pPr>
-              <a:t>‹nº›</a:t>
+              <a:t>‹#›</a:t>
             </a:fld>
             <a:endParaRPr lang="pt-BR"/>
           </a:p>
@@ -1821,7 +1821,7 @@
               <a:pPr>
                 <a:defRPr/>
               </a:pPr>
-              <a:t>05/05/2012</a:t>
+              <a:t>24/09/2012</a:t>
             </a:fld>
             <a:endParaRPr lang="pt-BR"/>
           </a:p>
@@ -1880,7 +1880,7 @@
               <a:pPr>
                 <a:defRPr/>
               </a:pPr>
-              <a:t>‹nº›</a:t>
+              <a:t>‹#›</a:t>
             </a:fld>
             <a:endParaRPr lang="pt-BR"/>
           </a:p>
@@ -2327,7 +2327,7 @@
               <a:pPr>
                 <a:defRPr/>
               </a:pPr>
-              <a:t>05/05/2012</a:t>
+              <a:t>24/09/2012</a:t>
             </a:fld>
             <a:endParaRPr lang="pt-BR"/>
           </a:p>
@@ -2386,7 +2386,7 @@
               <a:pPr>
                 <a:defRPr/>
               </a:pPr>
-              <a:t>‹nº›</a:t>
+              <a:t>‹#›</a:t>
             </a:fld>
             <a:endParaRPr lang="pt-BR"/>
           </a:p>
@@ -2618,7 +2618,7 @@
               <a:pPr>
                 <a:defRPr/>
               </a:pPr>
-              <a:t>05/05/2012</a:t>
+              <a:t>24/09/2012</a:t>
             </a:fld>
             <a:endParaRPr lang="pt-BR"/>
           </a:p>
@@ -2677,7 +2677,7 @@
               <a:pPr>
                 <a:defRPr/>
               </a:pPr>
-              <a:t>‹nº›</a:t>
+              <a:t>‹#›</a:t>
             </a:fld>
             <a:endParaRPr lang="pt-BR"/>
           </a:p>
@@ -3019,7 +3019,7 @@
               <a:pPr>
                 <a:defRPr/>
               </a:pPr>
-              <a:t>05/05/2012</a:t>
+              <a:t>24/09/2012</a:t>
             </a:fld>
             <a:endParaRPr lang="pt-BR"/>
           </a:p>
@@ -3078,7 +3078,7 @@
               <a:pPr>
                 <a:defRPr/>
               </a:pPr>
-              <a:t>‹nº›</a:t>
+              <a:t>‹#›</a:t>
             </a:fld>
             <a:endParaRPr lang="pt-BR"/>
           </a:p>
@@ -3168,7 +3168,7 @@
               <a:pPr>
                 <a:defRPr/>
               </a:pPr>
-              <a:t>05/05/2012</a:t>
+              <a:t>24/09/2012</a:t>
             </a:fld>
             <a:endParaRPr lang="pt-BR"/>
           </a:p>
@@ -3227,7 +3227,7 @@
               <a:pPr>
                 <a:defRPr/>
               </a:pPr>
-              <a:t>‹nº›</a:t>
+              <a:t>‹#›</a:t>
             </a:fld>
             <a:endParaRPr lang="pt-BR"/>
           </a:p>
@@ -3285,7 +3285,7 @@
               <a:pPr>
                 <a:defRPr/>
               </a:pPr>
-              <a:t>05/05/2012</a:t>
+              <a:t>24/09/2012</a:t>
             </a:fld>
             <a:endParaRPr lang="pt-BR"/>
           </a:p>
@@ -3344,7 +3344,7 @@
               <a:pPr>
                 <a:defRPr/>
               </a:pPr>
-              <a:t>‹nº›</a:t>
+              <a:t>‹#›</a:t>
             </a:fld>
             <a:endParaRPr lang="pt-BR"/>
           </a:p>
@@ -3561,7 +3561,7 @@
               <a:pPr>
                 <a:defRPr/>
               </a:pPr>
-              <a:t>05/05/2012</a:t>
+              <a:t>24/09/2012</a:t>
             </a:fld>
             <a:endParaRPr lang="pt-BR"/>
           </a:p>
@@ -3625,7 +3625,7 @@
               <a:pPr>
                 <a:defRPr/>
               </a:pPr>
-              <a:t>‹nº›</a:t>
+              <a:t>‹#›</a:t>
             </a:fld>
             <a:endParaRPr lang="pt-BR"/>
           </a:p>
@@ -3845,7 +3845,7 @@
               <a:pPr>
                 <a:defRPr/>
               </a:pPr>
-              <a:t>05/05/2012</a:t>
+              <a:t>24/09/2012</a:t>
             </a:fld>
             <a:endParaRPr lang="pt-BR"/>
           </a:p>
@@ -3904,7 +3904,7 @@
               <a:pPr>
                 <a:defRPr/>
               </a:pPr>
-              <a:t>‹nº›</a:t>
+              <a:t>‹#›</a:t>
             </a:fld>
             <a:endParaRPr lang="pt-BR"/>
           </a:p>
@@ -4173,7 +4173,7 @@
         <p:spPr bwMode="auto">
           <a:xfrm>
             <a:off x="457200" y="274638"/>
-            <a:ext cx="7467600" cy="1143000"/>
+            <a:ext cx="8329642" cy="1143000"/>
           </a:xfrm>
           <a:prstGeom prst="rect">
             <a:avLst/>
@@ -4196,10 +4196,10 @@
           <a:p>
             <a:pPr lvl="0"/>
             <a:r>
-              <a:rPr lang="pt-BR" smtClean="0"/>
+              <a:rPr lang="pt-BR" dirty="0" smtClean="0"/>
               <a:t>Clique para editar o estilo do título mestre</a:t>
             </a:r>
-            <a:endParaRPr lang="en-US" smtClean="0"/>
+            <a:endParaRPr lang="en-US" dirty="0" smtClean="0"/>
           </a:p>
         </p:txBody>
       </p:sp>
@@ -4323,7 +4323,7 @@
               <a:pPr>
                 <a:defRPr/>
               </a:pPr>
-              <a:t>05/05/2012</a:t>
+              <a:t>24/09/2012</a:t>
             </a:fld>
             <a:endParaRPr lang="pt-BR"/>
           </a:p>
@@ -4426,7 +4426,7 @@
               <a:pPr>
                 <a:defRPr/>
               </a:pPr>
-              <a:t>‹nº›</a:t>
+              <a:t>‹#›</a:t>
             </a:fld>
             <a:endParaRPr lang="pt-BR"/>
           </a:p>

</xml_diff>